<commit_message>
added mockup render to presentation
</commit_message>
<xml_diff>
--- a/doc/project_topic_presentation.pptx
+++ b/doc/project_topic_presentation.pptx
@@ -277,7 +277,7 @@
           <a:p>
             <a:fld id="{2AF8E8F0-B91F-4D3B-908D-CC7B526EF3BD}" type="datetimeFigureOut">
               <a:rPr lang="de-CH" smtClean="0"/>
-              <a:t>30.10.2018</a:t>
+              <a:t>01.11.2018</a:t>
             </a:fld>
             <a:endParaRPr lang="de-CH"/>
           </a:p>
@@ -477,7 +477,7 @@
           <a:p>
             <a:fld id="{2AF8E8F0-B91F-4D3B-908D-CC7B526EF3BD}" type="datetimeFigureOut">
               <a:rPr lang="de-CH" smtClean="0"/>
-              <a:t>30.10.2018</a:t>
+              <a:t>01.11.2018</a:t>
             </a:fld>
             <a:endParaRPr lang="de-CH"/>
           </a:p>
@@ -687,7 +687,7 @@
           <a:p>
             <a:fld id="{2AF8E8F0-B91F-4D3B-908D-CC7B526EF3BD}" type="datetimeFigureOut">
               <a:rPr lang="de-CH" smtClean="0"/>
-              <a:t>30.10.2018</a:t>
+              <a:t>01.11.2018</a:t>
             </a:fld>
             <a:endParaRPr lang="de-CH"/>
           </a:p>
@@ -887,7 +887,7 @@
           <a:p>
             <a:fld id="{2AF8E8F0-B91F-4D3B-908D-CC7B526EF3BD}" type="datetimeFigureOut">
               <a:rPr lang="de-CH" smtClean="0"/>
-              <a:t>30.10.2018</a:t>
+              <a:t>01.11.2018</a:t>
             </a:fld>
             <a:endParaRPr lang="de-CH"/>
           </a:p>
@@ -1163,7 +1163,7 @@
           <a:p>
             <a:fld id="{2AF8E8F0-B91F-4D3B-908D-CC7B526EF3BD}" type="datetimeFigureOut">
               <a:rPr lang="de-CH" smtClean="0"/>
-              <a:t>30.10.2018</a:t>
+              <a:t>01.11.2018</a:t>
             </a:fld>
             <a:endParaRPr lang="de-CH"/>
           </a:p>
@@ -1431,7 +1431,7 @@
           <a:p>
             <a:fld id="{2AF8E8F0-B91F-4D3B-908D-CC7B526EF3BD}" type="datetimeFigureOut">
               <a:rPr lang="de-CH" smtClean="0"/>
-              <a:t>30.10.2018</a:t>
+              <a:t>01.11.2018</a:t>
             </a:fld>
             <a:endParaRPr lang="de-CH"/>
           </a:p>
@@ -1846,7 +1846,7 @@
           <a:p>
             <a:fld id="{2AF8E8F0-B91F-4D3B-908D-CC7B526EF3BD}" type="datetimeFigureOut">
               <a:rPr lang="de-CH" smtClean="0"/>
-              <a:t>30.10.2018</a:t>
+              <a:t>01.11.2018</a:t>
             </a:fld>
             <a:endParaRPr lang="de-CH"/>
           </a:p>
@@ -1988,7 +1988,7 @@
           <a:p>
             <a:fld id="{2AF8E8F0-B91F-4D3B-908D-CC7B526EF3BD}" type="datetimeFigureOut">
               <a:rPr lang="de-CH" smtClean="0"/>
-              <a:t>30.10.2018</a:t>
+              <a:t>01.11.2018</a:t>
             </a:fld>
             <a:endParaRPr lang="de-CH"/>
           </a:p>
@@ -2101,7 +2101,7 @@
           <a:p>
             <a:fld id="{2AF8E8F0-B91F-4D3B-908D-CC7B526EF3BD}" type="datetimeFigureOut">
               <a:rPr lang="de-CH" smtClean="0"/>
-              <a:t>30.10.2018</a:t>
+              <a:t>01.11.2018</a:t>
             </a:fld>
             <a:endParaRPr lang="de-CH"/>
           </a:p>
@@ -2414,7 +2414,7 @@
           <a:p>
             <a:fld id="{2AF8E8F0-B91F-4D3B-908D-CC7B526EF3BD}" type="datetimeFigureOut">
               <a:rPr lang="de-CH" smtClean="0"/>
-              <a:t>30.10.2018</a:t>
+              <a:t>01.11.2018</a:t>
             </a:fld>
             <a:endParaRPr lang="de-CH"/>
           </a:p>
@@ -2703,7 +2703,7 @@
           <a:p>
             <a:fld id="{2AF8E8F0-B91F-4D3B-908D-CC7B526EF3BD}" type="datetimeFigureOut">
               <a:rPr lang="de-CH" smtClean="0"/>
-              <a:t>30.10.2018</a:t>
+              <a:t>01.11.2018</a:t>
             </a:fld>
             <a:endParaRPr lang="de-CH"/>
           </a:p>
@@ -2946,7 +2946,7 @@
           <a:p>
             <a:fld id="{2AF8E8F0-B91F-4D3B-908D-CC7B526EF3BD}" type="datetimeFigureOut">
               <a:rPr lang="de-CH" smtClean="0"/>
-              <a:t>30.10.2018</a:t>
+              <a:t>01.11.2018</a:t>
             </a:fld>
             <a:endParaRPr lang="de-CH"/>
           </a:p>
@@ -3571,21 +3571,22 @@
           </p:cNvPicPr>
           <p:nvPr/>
         </p:nvPicPr>
-        <p:blipFill rotWithShape="1">
-          <a:blip r:embed="rId2">
+        <p:blipFill>
+          <a:blip r:embed="rId3">
             <a:extLst>
               <a:ext uri="{28A0092B-C50C-407E-A947-70E740481C1C}">
                 <a14:useLocalDpi xmlns:a14="http://schemas.microsoft.com/office/drawing/2010/main" val="0"/>
               </a:ext>
             </a:extLst>
           </a:blip>
-          <a:srcRect t="18074" b="3203"/>
-          <a:stretch/>
+          <a:stretch>
+            <a:fillRect/>
+          </a:stretch>
         </p:blipFill>
         <p:spPr>
           <a:xfrm>
-            <a:off x="6817744" y="3432556"/>
-            <a:ext cx="4536058" cy="2678205"/>
+            <a:off x="6698825" y="3429000"/>
+            <a:ext cx="4654977" cy="2618424"/>
           </a:xfrm>
           <a:prstGeom prst="rect">
             <a:avLst/>

</xml_diff>

<commit_message>
Updated powerpoint and added the requirements list
</commit_message>
<xml_diff>
--- a/doc/project_topic_presentation.pptx
+++ b/doc/project_topic_presentation.pptx
@@ -7,10 +7,12 @@
   <p:sldIdLst>
     <p:sldId id="256" r:id="rId2"/>
     <p:sldId id="257" r:id="rId3"/>
-    <p:sldId id="258" r:id="rId4"/>
-    <p:sldId id="259" r:id="rId5"/>
-    <p:sldId id="260" r:id="rId6"/>
-    <p:sldId id="261" r:id="rId7"/>
+    <p:sldId id="262" r:id="rId4"/>
+    <p:sldId id="258" r:id="rId5"/>
+    <p:sldId id="259" r:id="rId6"/>
+    <p:sldId id="260" r:id="rId7"/>
+    <p:sldId id="263" r:id="rId8"/>
+    <p:sldId id="261" r:id="rId9"/>
   </p:sldIdLst>
   <p:sldSz cx="12192000" cy="6858000"/>
   <p:notesSz cx="6858000" cy="9144000"/>
@@ -277,7 +279,7 @@
           <a:p>
             <a:fld id="{2AF8E8F0-B91F-4D3B-908D-CC7B526EF3BD}" type="datetimeFigureOut">
               <a:rPr lang="de-CH" smtClean="0"/>
-              <a:t>01.11.2018</a:t>
+              <a:t>05.11.18</a:t>
             </a:fld>
             <a:endParaRPr lang="de-CH"/>
           </a:p>
@@ -331,7 +333,7 @@
           <a:p>
             <a:fld id="{0B62C952-6694-4C1D-BA38-C9BE852CAAAF}" type="slidenum">
               <a:rPr lang="de-CH" smtClean="0"/>
-              <a:t>‹#›</a:t>
+              <a:t>‹Nr.›</a:t>
             </a:fld>
             <a:endParaRPr lang="de-CH"/>
           </a:p>
@@ -477,7 +479,7 @@
           <a:p>
             <a:fld id="{2AF8E8F0-B91F-4D3B-908D-CC7B526EF3BD}" type="datetimeFigureOut">
               <a:rPr lang="de-CH" smtClean="0"/>
-              <a:t>01.11.2018</a:t>
+              <a:t>05.11.18</a:t>
             </a:fld>
             <a:endParaRPr lang="de-CH"/>
           </a:p>
@@ -531,7 +533,7 @@
           <a:p>
             <a:fld id="{0B62C952-6694-4C1D-BA38-C9BE852CAAAF}" type="slidenum">
               <a:rPr lang="de-CH" smtClean="0"/>
-              <a:t>‹#›</a:t>
+              <a:t>‹Nr.›</a:t>
             </a:fld>
             <a:endParaRPr lang="de-CH"/>
           </a:p>
@@ -687,7 +689,7 @@
           <a:p>
             <a:fld id="{2AF8E8F0-B91F-4D3B-908D-CC7B526EF3BD}" type="datetimeFigureOut">
               <a:rPr lang="de-CH" smtClean="0"/>
-              <a:t>01.11.2018</a:t>
+              <a:t>05.11.18</a:t>
             </a:fld>
             <a:endParaRPr lang="de-CH"/>
           </a:p>
@@ -741,7 +743,7 @@
           <a:p>
             <a:fld id="{0B62C952-6694-4C1D-BA38-C9BE852CAAAF}" type="slidenum">
               <a:rPr lang="de-CH" smtClean="0"/>
-              <a:t>‹#›</a:t>
+              <a:t>‹Nr.›</a:t>
             </a:fld>
             <a:endParaRPr lang="de-CH"/>
           </a:p>
@@ -887,7 +889,7 @@
           <a:p>
             <a:fld id="{2AF8E8F0-B91F-4D3B-908D-CC7B526EF3BD}" type="datetimeFigureOut">
               <a:rPr lang="de-CH" smtClean="0"/>
-              <a:t>01.11.2018</a:t>
+              <a:t>05.11.18</a:t>
             </a:fld>
             <a:endParaRPr lang="de-CH"/>
           </a:p>
@@ -941,7 +943,7 @@
           <a:p>
             <a:fld id="{0B62C952-6694-4C1D-BA38-C9BE852CAAAF}" type="slidenum">
               <a:rPr lang="de-CH" smtClean="0"/>
-              <a:t>‹#›</a:t>
+              <a:t>‹Nr.›</a:t>
             </a:fld>
             <a:endParaRPr lang="de-CH"/>
           </a:p>
@@ -1163,7 +1165,7 @@
           <a:p>
             <a:fld id="{2AF8E8F0-B91F-4D3B-908D-CC7B526EF3BD}" type="datetimeFigureOut">
               <a:rPr lang="de-CH" smtClean="0"/>
-              <a:t>01.11.2018</a:t>
+              <a:t>05.11.18</a:t>
             </a:fld>
             <a:endParaRPr lang="de-CH"/>
           </a:p>
@@ -1217,7 +1219,7 @@
           <a:p>
             <a:fld id="{0B62C952-6694-4C1D-BA38-C9BE852CAAAF}" type="slidenum">
               <a:rPr lang="de-CH" smtClean="0"/>
-              <a:t>‹#›</a:t>
+              <a:t>‹Nr.›</a:t>
             </a:fld>
             <a:endParaRPr lang="de-CH"/>
           </a:p>
@@ -1431,7 +1433,7 @@
           <a:p>
             <a:fld id="{2AF8E8F0-B91F-4D3B-908D-CC7B526EF3BD}" type="datetimeFigureOut">
               <a:rPr lang="de-CH" smtClean="0"/>
-              <a:t>01.11.2018</a:t>
+              <a:t>05.11.18</a:t>
             </a:fld>
             <a:endParaRPr lang="de-CH"/>
           </a:p>
@@ -1485,7 +1487,7 @@
           <a:p>
             <a:fld id="{0B62C952-6694-4C1D-BA38-C9BE852CAAAF}" type="slidenum">
               <a:rPr lang="de-CH" smtClean="0"/>
-              <a:t>‹#›</a:t>
+              <a:t>‹Nr.›</a:t>
             </a:fld>
             <a:endParaRPr lang="de-CH"/>
           </a:p>
@@ -1846,7 +1848,7 @@
           <a:p>
             <a:fld id="{2AF8E8F0-B91F-4D3B-908D-CC7B526EF3BD}" type="datetimeFigureOut">
               <a:rPr lang="de-CH" smtClean="0"/>
-              <a:t>01.11.2018</a:t>
+              <a:t>05.11.18</a:t>
             </a:fld>
             <a:endParaRPr lang="de-CH"/>
           </a:p>
@@ -1900,7 +1902,7 @@
           <a:p>
             <a:fld id="{0B62C952-6694-4C1D-BA38-C9BE852CAAAF}" type="slidenum">
               <a:rPr lang="de-CH" smtClean="0"/>
-              <a:t>‹#›</a:t>
+              <a:t>‹Nr.›</a:t>
             </a:fld>
             <a:endParaRPr lang="de-CH"/>
           </a:p>
@@ -1988,7 +1990,7 @@
           <a:p>
             <a:fld id="{2AF8E8F0-B91F-4D3B-908D-CC7B526EF3BD}" type="datetimeFigureOut">
               <a:rPr lang="de-CH" smtClean="0"/>
-              <a:t>01.11.2018</a:t>
+              <a:t>05.11.18</a:t>
             </a:fld>
             <a:endParaRPr lang="de-CH"/>
           </a:p>
@@ -2042,7 +2044,7 @@
           <a:p>
             <a:fld id="{0B62C952-6694-4C1D-BA38-C9BE852CAAAF}" type="slidenum">
               <a:rPr lang="de-CH" smtClean="0"/>
-              <a:t>‹#›</a:t>
+              <a:t>‹Nr.›</a:t>
             </a:fld>
             <a:endParaRPr lang="de-CH"/>
           </a:p>
@@ -2101,7 +2103,7 @@
           <a:p>
             <a:fld id="{2AF8E8F0-B91F-4D3B-908D-CC7B526EF3BD}" type="datetimeFigureOut">
               <a:rPr lang="de-CH" smtClean="0"/>
-              <a:t>01.11.2018</a:t>
+              <a:t>05.11.18</a:t>
             </a:fld>
             <a:endParaRPr lang="de-CH"/>
           </a:p>
@@ -2155,7 +2157,7 @@
           <a:p>
             <a:fld id="{0B62C952-6694-4C1D-BA38-C9BE852CAAAF}" type="slidenum">
               <a:rPr lang="de-CH" smtClean="0"/>
-              <a:t>‹#›</a:t>
+              <a:t>‹Nr.›</a:t>
             </a:fld>
             <a:endParaRPr lang="de-CH"/>
           </a:p>
@@ -2414,7 +2416,7 @@
           <a:p>
             <a:fld id="{2AF8E8F0-B91F-4D3B-908D-CC7B526EF3BD}" type="datetimeFigureOut">
               <a:rPr lang="de-CH" smtClean="0"/>
-              <a:t>01.11.2018</a:t>
+              <a:t>05.11.18</a:t>
             </a:fld>
             <a:endParaRPr lang="de-CH"/>
           </a:p>
@@ -2468,7 +2470,7 @@
           <a:p>
             <a:fld id="{0B62C952-6694-4C1D-BA38-C9BE852CAAAF}" type="slidenum">
               <a:rPr lang="de-CH" smtClean="0"/>
-              <a:t>‹#›</a:t>
+              <a:t>‹Nr.›</a:t>
             </a:fld>
             <a:endParaRPr lang="de-CH"/>
           </a:p>
@@ -2703,7 +2705,7 @@
           <a:p>
             <a:fld id="{2AF8E8F0-B91F-4D3B-908D-CC7B526EF3BD}" type="datetimeFigureOut">
               <a:rPr lang="de-CH" smtClean="0"/>
-              <a:t>01.11.2018</a:t>
+              <a:t>05.11.18</a:t>
             </a:fld>
             <a:endParaRPr lang="de-CH"/>
           </a:p>
@@ -2757,7 +2759,7 @@
           <a:p>
             <a:fld id="{0B62C952-6694-4C1D-BA38-C9BE852CAAAF}" type="slidenum">
               <a:rPr lang="de-CH" smtClean="0"/>
-              <a:t>‹#›</a:t>
+              <a:t>‹Nr.›</a:t>
             </a:fld>
             <a:endParaRPr lang="de-CH"/>
           </a:p>
@@ -2946,7 +2948,7 @@
           <a:p>
             <a:fld id="{2AF8E8F0-B91F-4D3B-908D-CC7B526EF3BD}" type="datetimeFigureOut">
               <a:rPr lang="de-CH" smtClean="0"/>
-              <a:t>01.11.2018</a:t>
+              <a:t>05.11.18</a:t>
             </a:fld>
             <a:endParaRPr lang="de-CH"/>
           </a:p>
@@ -3036,7 +3038,7 @@
           <a:p>
             <a:fld id="{0B62C952-6694-4C1D-BA38-C9BE852CAAAF}" type="slidenum">
               <a:rPr lang="de-CH" smtClean="0"/>
-              <a:t>‹#›</a:t>
+              <a:t>‹Nr.›</a:t>
             </a:fld>
             <a:endParaRPr lang="de-CH"/>
           </a:p>
@@ -3470,7 +3472,15 @@
           <a:p>
             <a:r>
               <a:rPr lang="de-CH" dirty="0"/>
-              <a:t>Überblick</a:t>
+              <a:t>Überblick </a:t>
+            </a:r>
+            <a:r>
+              <a:rPr lang="de-CH" dirty="0">
+                <a:solidFill>
+                  <a:srgbClr val="FF0000"/>
+                </a:solidFill>
+              </a:rPr>
+              <a:t>ohne Jargon</a:t>
             </a:r>
           </a:p>
         </p:txBody>
@@ -3625,10 +3635,10 @@
       </p:grpSpPr>
       <p:sp>
         <p:nvSpPr>
-          <p:cNvPr id="2" name="Title 1">
-            <a:extLst>
-              <a:ext uri="{FF2B5EF4-FFF2-40B4-BE49-F238E27FC236}">
-                <a16:creationId xmlns:a16="http://schemas.microsoft.com/office/drawing/2014/main" id="{20AB2FD1-99AA-42FA-B93B-6AEAD959DB0E}"/>
+          <p:cNvPr id="2" name="Titel 1">
+            <a:extLst>
+              <a:ext uri="{FF2B5EF4-FFF2-40B4-BE49-F238E27FC236}">
+                <a16:creationId xmlns:a16="http://schemas.microsoft.com/office/drawing/2014/main" id="{BDA852AD-65AF-C640-853F-BEE2E7C257F5}"/>
               </a:ext>
             </a:extLst>
           </p:cNvPr>
@@ -3645,18 +3655,22 @@
           <a:lstStyle/>
           <a:p>
             <a:r>
-              <a:rPr lang="de-CH" dirty="0"/>
-              <a:t>Unterstützung und Automatisierung</a:t>
-            </a:r>
-          </a:p>
-        </p:txBody>
-      </p:sp>
-      <p:sp>
-        <p:nvSpPr>
-          <p:cNvPr id="3" name="Content Placeholder 2">
-            <a:extLst>
-              <a:ext uri="{FF2B5EF4-FFF2-40B4-BE49-F238E27FC236}">
-                <a16:creationId xmlns:a16="http://schemas.microsoft.com/office/drawing/2014/main" id="{93529553-759E-435C-8767-670C23005F4B}"/>
+              <a:rPr lang="de-DE" dirty="0">
+                <a:solidFill>
+                  <a:srgbClr val="FF0000"/>
+                </a:solidFill>
+              </a:rPr>
+              <a:t>Wie wird’s heute gemacht</a:t>
+            </a:r>
+          </a:p>
+        </p:txBody>
+      </p:sp>
+      <p:sp>
+        <p:nvSpPr>
+          <p:cNvPr id="3" name="Inhaltsplatzhalter 2">
+            <a:extLst>
+              <a:ext uri="{FF2B5EF4-FFF2-40B4-BE49-F238E27FC236}">
+                <a16:creationId xmlns:a16="http://schemas.microsoft.com/office/drawing/2014/main" id="{F61E16D1-9F36-CF47-9FC4-B6142A1FF3E3}"/>
               </a:ext>
             </a:extLst>
           </p:cNvPr>
@@ -3673,38 +3687,96 @@
           <a:lstStyle/>
           <a:p>
             <a:r>
-              <a:rPr lang="de-CH" dirty="0"/>
-              <a:t>Wecker</a:t>
-            </a:r>
-          </a:p>
-          <a:p>
-            <a:r>
-              <a:rPr lang="de-CH" dirty="0"/>
-              <a:t>Wohnungstemperatur</a:t>
-            </a:r>
-          </a:p>
-          <a:p>
-            <a:r>
-              <a:rPr lang="de-CH" dirty="0"/>
-              <a:t>Wetter und –vorhersage</a:t>
-            </a:r>
-          </a:p>
-          <a:p>
-            <a:r>
-              <a:rPr lang="de-CH" dirty="0"/>
-              <a:t>E-Mail</a:t>
-            </a:r>
-          </a:p>
-          <a:p>
-            <a:r>
-              <a:rPr lang="de-CH" dirty="0"/>
-              <a:t>Kalender</a:t>
-            </a:r>
-          </a:p>
-          <a:p>
-            <a:r>
-              <a:rPr lang="de-CH" dirty="0"/>
-              <a:t>TTS</a:t>
+              <a:rPr lang="de-DE" dirty="0">
+                <a:solidFill>
+                  <a:srgbClr val="FF0000"/>
+                </a:solidFill>
+              </a:rPr>
+              <a:t>Was sind limitierende Faktoren</a:t>
+            </a:r>
+          </a:p>
+          <a:p>
+            <a:r>
+              <a:rPr lang="de-DE" dirty="0">
+                <a:solidFill>
+                  <a:srgbClr val="FF0000"/>
+                </a:solidFill>
+              </a:rPr>
+              <a:t>Was machen wir anders -&gt; besser?</a:t>
+            </a:r>
+          </a:p>
+          <a:p>
+            <a:r>
+              <a:rPr lang="de-DE" dirty="0">
+                <a:solidFill>
+                  <a:srgbClr val="FF0000"/>
+                </a:solidFill>
+              </a:rPr>
+              <a:t>Für wen relevant , interessant -&gt; </a:t>
+            </a:r>
+            <a:r>
+              <a:rPr lang="de-DE" dirty="0" err="1">
+                <a:solidFill>
+                  <a:srgbClr val="FF0000"/>
+                </a:solidFill>
+              </a:rPr>
+              <a:t>what</a:t>
+            </a:r>
+            <a:r>
+              <a:rPr lang="de-DE" dirty="0">
+                <a:solidFill>
+                  <a:srgbClr val="FF0000"/>
+                </a:solidFill>
+              </a:rPr>
+              <a:t> </a:t>
+            </a:r>
+            <a:r>
+              <a:rPr lang="de-DE" dirty="0" err="1">
+                <a:solidFill>
+                  <a:srgbClr val="FF0000"/>
+                </a:solidFill>
+              </a:rPr>
+              <a:t>difference</a:t>
+            </a:r>
+            <a:r>
+              <a:rPr lang="de-DE" dirty="0">
+                <a:solidFill>
+                  <a:srgbClr val="FF0000"/>
+                </a:solidFill>
+              </a:rPr>
+              <a:t> will </a:t>
+            </a:r>
+            <a:r>
+              <a:rPr lang="de-DE" dirty="0" err="1">
+                <a:solidFill>
+                  <a:srgbClr val="FF0000"/>
+                </a:solidFill>
+              </a:rPr>
+              <a:t>it</a:t>
+            </a:r>
+            <a:r>
+              <a:rPr lang="de-DE" dirty="0">
+                <a:solidFill>
+                  <a:srgbClr val="FF0000"/>
+                </a:solidFill>
+              </a:rPr>
+              <a:t> </a:t>
+            </a:r>
+            <a:r>
+              <a:rPr lang="de-DE" dirty="0" err="1">
+                <a:solidFill>
+                  <a:srgbClr val="FF0000"/>
+                </a:solidFill>
+              </a:rPr>
+              <a:t>make</a:t>
+            </a:r>
+            <a:r>
+              <a:rPr lang="de-DE" dirty="0">
+                <a:solidFill>
+                  <a:srgbClr val="FF0000"/>
+                </a:solidFill>
+              </a:rPr>
+              <a:t>?</a:t>
             </a:r>
           </a:p>
         </p:txBody>
@@ -3712,7 +3784,7 @@
     </p:spTree>
     <p:extLst>
       <p:ext uri="{BB962C8B-B14F-4D97-AF65-F5344CB8AC3E}">
-        <p14:creationId xmlns:p14="http://schemas.microsoft.com/office/powerpoint/2010/main" val="2952514580"/>
+        <p14:creationId xmlns:p14="http://schemas.microsoft.com/office/powerpoint/2010/main" val="4246608341"/>
       </p:ext>
     </p:extLst>
   </p:cSld>
@@ -3744,7 +3816,7 @@
           <p:cNvPr id="2" name="Title 1">
             <a:extLst>
               <a:ext uri="{FF2B5EF4-FFF2-40B4-BE49-F238E27FC236}">
-                <a16:creationId xmlns:a16="http://schemas.microsoft.com/office/drawing/2014/main" id="{097881E7-BA56-4EE0-A6BA-9F2ECAFB65BD}"/>
+                <a16:creationId xmlns:a16="http://schemas.microsoft.com/office/drawing/2014/main" id="{20AB2FD1-99AA-42FA-B93B-6AEAD959DB0E}"/>
               </a:ext>
             </a:extLst>
           </p:cNvPr>
@@ -3762,8 +3834,61 @@
           <a:p>
             <a:r>
               <a:rPr lang="de-CH" dirty="0"/>
-              <a:t>Teile und Hardware</a:t>
-            </a:r>
+              <a:t>Unterstützung und Automatisierung </a:t>
+            </a:r>
+            <a:r>
+              <a:rPr lang="de-CH" dirty="0">
+                <a:solidFill>
+                  <a:srgbClr val="FF0000"/>
+                </a:solidFill>
+              </a:rPr>
+              <a:t>+ </a:t>
+            </a:r>
+            <a:r>
+              <a:rPr lang="de-CH" dirty="0" err="1">
+                <a:solidFill>
+                  <a:srgbClr val="FF0000"/>
+                </a:solidFill>
+              </a:rPr>
+              <a:t>risks</a:t>
+            </a:r>
+            <a:r>
+              <a:rPr lang="de-CH" dirty="0">
+                <a:solidFill>
+                  <a:srgbClr val="FF0000"/>
+                </a:solidFill>
+              </a:rPr>
+              <a:t> </a:t>
+            </a:r>
+            <a:r>
+              <a:rPr lang="de-CH" dirty="0" err="1">
+                <a:solidFill>
+                  <a:srgbClr val="FF0000"/>
+                </a:solidFill>
+              </a:rPr>
+              <a:t>and</a:t>
+            </a:r>
+            <a:r>
+              <a:rPr lang="de-CH" dirty="0">
+                <a:solidFill>
+                  <a:srgbClr val="FF0000"/>
+                </a:solidFill>
+              </a:rPr>
+              <a:t> </a:t>
+            </a:r>
+            <a:r>
+              <a:rPr lang="de-CH" dirty="0" err="1">
+                <a:solidFill>
+                  <a:srgbClr val="FF0000"/>
+                </a:solidFill>
+              </a:rPr>
+              <a:t>payoffs</a:t>
+            </a:r>
+            <a:endParaRPr lang="de-CH" dirty="0">
+              <a:solidFill>
+                <a:srgbClr val="FF0000"/>
+              </a:solidFill>
+            </a:endParaRPr>
           </a:p>
         </p:txBody>
       </p:sp>
@@ -3772,7 +3897,7 @@
           <p:cNvPr id="3" name="Content Placeholder 2">
             <a:extLst>
               <a:ext uri="{FF2B5EF4-FFF2-40B4-BE49-F238E27FC236}">
-                <a16:creationId xmlns:a16="http://schemas.microsoft.com/office/drawing/2014/main" id="{2953F4C9-5E64-44C6-8299-4992E9E0A097}"/>
+                <a16:creationId xmlns:a16="http://schemas.microsoft.com/office/drawing/2014/main" id="{93529553-759E-435C-8767-670C23005F4B}"/>
               </a:ext>
             </a:extLst>
           </p:cNvPr>
@@ -3790,43 +3915,37 @@
           <a:p>
             <a:r>
               <a:rPr lang="de-CH" dirty="0"/>
-              <a:t>Raspberry Pi 3 B+ (€36.89, Amazon)</a:t>
+              <a:t>Wecker</a:t>
             </a:r>
           </a:p>
           <a:p>
             <a:r>
               <a:rPr lang="de-CH" dirty="0"/>
-              <a:t>Netzteil (€9.91, Amazon)</a:t>
+              <a:t>Wohnungstemperatur</a:t>
             </a:r>
           </a:p>
           <a:p>
             <a:r>
               <a:rPr lang="de-CH" dirty="0"/>
-              <a:t>Display (€16.88, Amazon)</a:t>
+              <a:t>Wetter und –vorhersage</a:t>
             </a:r>
           </a:p>
           <a:p>
             <a:r>
               <a:rPr lang="de-CH" dirty="0"/>
-              <a:t>Temperatursensor (€2.95, Amazon)</a:t>
+              <a:t>E-Mail</a:t>
             </a:r>
           </a:p>
           <a:p>
             <a:r>
               <a:rPr lang="de-CH" dirty="0"/>
-              <a:t>Lautsprecher (€9.99, Amazon)</a:t>
+              <a:t>Kalender</a:t>
             </a:r>
           </a:p>
           <a:p>
             <a:r>
               <a:rPr lang="de-CH" dirty="0"/>
-              <a:t>Total €76.62, CHF 87.48</a:t>
-            </a:r>
-          </a:p>
-          <a:p>
-            <a:r>
-              <a:rPr lang="de-CH" dirty="0"/>
-              <a:t>Sperrholz und Leim für Gehäuse (&lt;CHF8.-)</a:t>
+              <a:t>TTS</a:t>
             </a:r>
           </a:p>
         </p:txBody>
@@ -3834,7 +3953,7 @@
     </p:spTree>
     <p:extLst>
       <p:ext uri="{BB962C8B-B14F-4D97-AF65-F5344CB8AC3E}">
-        <p14:creationId xmlns:p14="http://schemas.microsoft.com/office/powerpoint/2010/main" val="2866627426"/>
+        <p14:creationId xmlns:p14="http://schemas.microsoft.com/office/powerpoint/2010/main" val="2952514580"/>
       </p:ext>
     </p:extLst>
   </p:cSld>
@@ -3866,7 +3985,7 @@
           <p:cNvPr id="2" name="Title 1">
             <a:extLst>
               <a:ext uri="{FF2B5EF4-FFF2-40B4-BE49-F238E27FC236}">
-                <a16:creationId xmlns:a16="http://schemas.microsoft.com/office/drawing/2014/main" id="{6D425298-2A00-4600-A488-41331954FA47}"/>
+                <a16:creationId xmlns:a16="http://schemas.microsoft.com/office/drawing/2014/main" id="{097881E7-BA56-4EE0-A6BA-9F2ECAFB65BD}"/>
               </a:ext>
             </a:extLst>
           </p:cNvPr>
@@ -3884,8 +4003,33 @@
           <a:p>
             <a:r>
               <a:rPr lang="de-CH" dirty="0"/>
-              <a:t>Software und Technologien</a:t>
-            </a:r>
+              <a:t>Teile und Hardware </a:t>
+            </a:r>
+            <a:r>
+              <a:rPr lang="de-CH" dirty="0">
+                <a:solidFill>
+                  <a:srgbClr val="FF0000"/>
+                </a:solidFill>
+              </a:rPr>
+              <a:t>+</a:t>
+            </a:r>
+            <a:r>
+              <a:rPr lang="de-CH" dirty="0"/>
+              <a:t> </a:t>
+            </a:r>
+            <a:r>
+              <a:rPr lang="de-CH" dirty="0" err="1">
+                <a:solidFill>
+                  <a:srgbClr val="FF0000"/>
+                </a:solidFill>
+              </a:rPr>
+              <a:t>Shipping</a:t>
+            </a:r>
+            <a:endParaRPr lang="de-CH" dirty="0">
+              <a:solidFill>
+                <a:srgbClr val="FF0000"/>
+              </a:solidFill>
+            </a:endParaRPr>
           </a:p>
         </p:txBody>
       </p:sp>
@@ -3894,7 +4038,7 @@
           <p:cNvPr id="3" name="Content Placeholder 2">
             <a:extLst>
               <a:ext uri="{FF2B5EF4-FFF2-40B4-BE49-F238E27FC236}">
-                <a16:creationId xmlns:a16="http://schemas.microsoft.com/office/drawing/2014/main" id="{93D14867-EFDF-4110-B7C4-86AD970B3037}"/>
+                <a16:creationId xmlns:a16="http://schemas.microsoft.com/office/drawing/2014/main" id="{2953F4C9-5E64-44C6-8299-4992E9E0A097}"/>
               </a:ext>
             </a:extLst>
           </p:cNvPr>
@@ -3912,57 +4056,43 @@
           <a:p>
             <a:r>
               <a:rPr lang="de-CH" dirty="0"/>
-              <a:t>GitHub</a:t>
-            </a:r>
-          </a:p>
-          <a:p>
-            <a:r>
-              <a:rPr lang="de-CH" dirty="0" err="1"/>
-              <a:t>React</a:t>
-            </a:r>
-            <a:endParaRPr lang="de-CH" dirty="0"/>
+              <a:t>Raspberry Pi 3 B+ (€36.89, Amazon)</a:t>
+            </a:r>
           </a:p>
           <a:p>
             <a:r>
               <a:rPr lang="de-CH" dirty="0"/>
-              <a:t>Java</a:t>
-            </a:r>
-          </a:p>
-          <a:p>
-            <a:pPr lvl="1"/>
+              <a:t>Netzteil (€9.91, Amazon)</a:t>
+            </a:r>
+          </a:p>
+          <a:p>
             <a:r>
               <a:rPr lang="de-CH" dirty="0"/>
-              <a:t>E-Mail</a:t>
+              <a:t>Display (€16.88, Amazon)</a:t>
             </a:r>
           </a:p>
           <a:p>
             <a:r>
               <a:rPr lang="de-CH" dirty="0"/>
-              <a:t>Google API</a:t>
-            </a:r>
-          </a:p>
-          <a:p>
-            <a:pPr lvl="1"/>
-            <a:r>
-              <a:rPr lang="de-CH" dirty="0" err="1"/>
-              <a:t>Calendar</a:t>
-            </a:r>
-            <a:endParaRPr lang="de-CH" dirty="0"/>
-          </a:p>
-          <a:p>
-            <a:r>
-              <a:rPr lang="de-CH" dirty="0" err="1"/>
-              <a:t>OpenWeatherMap</a:t>
-            </a:r>
+              <a:t>Temperatursensor (€2.95, Amazon)</a:t>
+            </a:r>
+          </a:p>
+          <a:p>
             <a:r>
               <a:rPr lang="de-CH" dirty="0"/>
-              <a:t> API</a:t>
+              <a:t>Lautsprecher (€9.99, Amazon)</a:t>
             </a:r>
           </a:p>
           <a:p>
             <a:r>
               <a:rPr lang="de-CH" dirty="0"/>
-              <a:t>MySQL</a:t>
+              <a:t>Total €76.62, CHF 87.48</a:t>
+            </a:r>
+          </a:p>
+          <a:p>
+            <a:r>
+              <a:rPr lang="de-CH" dirty="0"/>
+              <a:t>Sperrholz und Leim für Gehäuse (&lt;CHF8.-)</a:t>
             </a:r>
           </a:p>
         </p:txBody>
@@ -3970,7 +4100,7 @@
     </p:spTree>
     <p:extLst>
       <p:ext uri="{BB962C8B-B14F-4D97-AF65-F5344CB8AC3E}">
-        <p14:creationId xmlns:p14="http://schemas.microsoft.com/office/powerpoint/2010/main" val="1997843676"/>
+        <p14:creationId xmlns:p14="http://schemas.microsoft.com/office/powerpoint/2010/main" val="2866627426"/>
       </p:ext>
     </p:extLst>
   </p:cSld>
@@ -4002,6 +4132,246 @@
           <p:cNvPr id="2" name="Title 1">
             <a:extLst>
               <a:ext uri="{FF2B5EF4-FFF2-40B4-BE49-F238E27FC236}">
+                <a16:creationId xmlns:a16="http://schemas.microsoft.com/office/drawing/2014/main" id="{6D425298-2A00-4600-A488-41331954FA47}"/>
+              </a:ext>
+            </a:extLst>
+          </p:cNvPr>
+          <p:cNvSpPr>
+            <a:spLocks noGrp="1"/>
+          </p:cNvSpPr>
+          <p:nvPr>
+            <p:ph type="title"/>
+          </p:nvPr>
+        </p:nvSpPr>
+        <p:spPr/>
+        <p:txBody>
+          <a:bodyPr/>
+          <a:lstStyle/>
+          <a:p>
+            <a:r>
+              <a:rPr lang="de-CH" dirty="0"/>
+              <a:t>Software und Technologien</a:t>
+            </a:r>
+          </a:p>
+        </p:txBody>
+      </p:sp>
+      <p:sp>
+        <p:nvSpPr>
+          <p:cNvPr id="3" name="Content Placeholder 2">
+            <a:extLst>
+              <a:ext uri="{FF2B5EF4-FFF2-40B4-BE49-F238E27FC236}">
+                <a16:creationId xmlns:a16="http://schemas.microsoft.com/office/drawing/2014/main" id="{93D14867-EFDF-4110-B7C4-86AD970B3037}"/>
+              </a:ext>
+            </a:extLst>
+          </p:cNvPr>
+          <p:cNvSpPr>
+            <a:spLocks noGrp="1"/>
+          </p:cNvSpPr>
+          <p:nvPr>
+            <p:ph idx="1"/>
+          </p:nvPr>
+        </p:nvSpPr>
+        <p:spPr/>
+        <p:txBody>
+          <a:bodyPr/>
+          <a:lstStyle/>
+          <a:p>
+            <a:r>
+              <a:rPr lang="de-CH" dirty="0"/>
+              <a:t>GitHub</a:t>
+            </a:r>
+          </a:p>
+          <a:p>
+            <a:r>
+              <a:rPr lang="de-CH" dirty="0" err="1"/>
+              <a:t>React</a:t>
+            </a:r>
+            <a:endParaRPr lang="de-CH" dirty="0"/>
+          </a:p>
+          <a:p>
+            <a:r>
+              <a:rPr lang="de-CH" dirty="0"/>
+              <a:t>Java</a:t>
+            </a:r>
+          </a:p>
+          <a:p>
+            <a:pPr lvl="1"/>
+            <a:r>
+              <a:rPr lang="de-CH" dirty="0"/>
+              <a:t>E-Mail</a:t>
+            </a:r>
+          </a:p>
+          <a:p>
+            <a:r>
+              <a:rPr lang="de-CH" dirty="0"/>
+              <a:t>Google API</a:t>
+            </a:r>
+          </a:p>
+          <a:p>
+            <a:pPr lvl="1"/>
+            <a:r>
+              <a:rPr lang="de-CH" dirty="0" err="1"/>
+              <a:t>Calendar</a:t>
+            </a:r>
+            <a:endParaRPr lang="de-CH" dirty="0"/>
+          </a:p>
+          <a:p>
+            <a:r>
+              <a:rPr lang="de-CH" dirty="0" err="1"/>
+              <a:t>OpenWeatherMap</a:t>
+            </a:r>
+            <a:r>
+              <a:rPr lang="de-CH" dirty="0"/>
+              <a:t> API</a:t>
+            </a:r>
+          </a:p>
+          <a:p>
+            <a:r>
+              <a:rPr lang="de-CH" dirty="0"/>
+              <a:t>MySQL</a:t>
+            </a:r>
+          </a:p>
+        </p:txBody>
+      </p:sp>
+    </p:spTree>
+    <p:extLst>
+      <p:ext uri="{BB962C8B-B14F-4D97-AF65-F5344CB8AC3E}">
+        <p14:creationId xmlns:p14="http://schemas.microsoft.com/office/powerpoint/2010/main" val="1997843676"/>
+      </p:ext>
+    </p:extLst>
+  </p:cSld>
+  <p:clrMapOvr>
+    <a:masterClrMapping/>
+  </p:clrMapOvr>
+</p:sld>
+</file>
+
+<file path=ppt/slides/slide7.xml><?xml version="1.0" encoding="utf-8"?>
+<p:sld xmlns:a="http://schemas.openxmlformats.org/drawingml/2006/main" xmlns:r="http://schemas.openxmlformats.org/officeDocument/2006/relationships" xmlns:p="http://schemas.openxmlformats.org/presentationml/2006/main">
+  <p:cSld>
+    <p:spTree>
+      <p:nvGrpSpPr>
+        <p:cNvPr id="1" name=""/>
+        <p:cNvGrpSpPr/>
+        <p:nvPr/>
+      </p:nvGrpSpPr>
+      <p:grpSpPr>
+        <a:xfrm>
+          <a:off x="0" y="0"/>
+          <a:ext cx="0" cy="0"/>
+          <a:chOff x="0" y="0"/>
+          <a:chExt cx="0" cy="0"/>
+        </a:xfrm>
+      </p:grpSpPr>
+      <p:sp>
+        <p:nvSpPr>
+          <p:cNvPr id="2" name="Titel 1">
+            <a:extLst>
+              <a:ext uri="{FF2B5EF4-FFF2-40B4-BE49-F238E27FC236}">
+                <a16:creationId xmlns:a16="http://schemas.microsoft.com/office/drawing/2014/main" id="{47D69ED9-A493-D24B-BCF1-2E9EE1200417}"/>
+              </a:ext>
+            </a:extLst>
+          </p:cNvPr>
+          <p:cNvSpPr>
+            <a:spLocks noGrp="1"/>
+          </p:cNvSpPr>
+          <p:nvPr>
+            <p:ph type="title"/>
+          </p:nvPr>
+        </p:nvSpPr>
+        <p:spPr/>
+        <p:txBody>
+          <a:bodyPr/>
+          <a:lstStyle/>
+          <a:p>
+            <a:r>
+              <a:rPr lang="de-DE" dirty="0">
+                <a:solidFill>
+                  <a:srgbClr val="FF0000"/>
+                </a:solidFill>
+              </a:rPr>
+              <a:t>Ziel</a:t>
+            </a:r>
+          </a:p>
+        </p:txBody>
+      </p:sp>
+      <p:sp>
+        <p:nvSpPr>
+          <p:cNvPr id="3" name="Inhaltsplatzhalter 2">
+            <a:extLst>
+              <a:ext uri="{FF2B5EF4-FFF2-40B4-BE49-F238E27FC236}">
+                <a16:creationId xmlns:a16="http://schemas.microsoft.com/office/drawing/2014/main" id="{C8E3E76B-F87F-B648-8C09-D77BF94FD338}"/>
+              </a:ext>
+            </a:extLst>
+          </p:cNvPr>
+          <p:cNvSpPr>
+            <a:spLocks noGrp="1"/>
+          </p:cNvSpPr>
+          <p:nvPr>
+            <p:ph idx="1"/>
+          </p:nvPr>
+        </p:nvSpPr>
+        <p:spPr/>
+        <p:txBody>
+          <a:bodyPr/>
+          <a:lstStyle/>
+          <a:p>
+            <a:r>
+              <a:rPr lang="de-DE" dirty="0">
+                <a:solidFill>
+                  <a:srgbClr val="FF0000"/>
+                </a:solidFill>
+              </a:rPr>
+              <a:t>Was muss sitzen, damit es erfolgreich ist</a:t>
+            </a:r>
+          </a:p>
+          <a:p>
+            <a:r>
+              <a:rPr lang="de-DE" dirty="0">
+                <a:solidFill>
+                  <a:srgbClr val="FF0000"/>
+                </a:solidFill>
+              </a:rPr>
+              <a:t>-&gt; wie sind wir im Zeitplan</a:t>
+            </a:r>
+          </a:p>
+        </p:txBody>
+      </p:sp>
+    </p:spTree>
+    <p:extLst>
+      <p:ext uri="{BB962C8B-B14F-4D97-AF65-F5344CB8AC3E}">
+        <p14:creationId xmlns:p14="http://schemas.microsoft.com/office/powerpoint/2010/main" val="2044268712"/>
+      </p:ext>
+    </p:extLst>
+  </p:cSld>
+  <p:clrMapOvr>
+    <a:masterClrMapping/>
+  </p:clrMapOvr>
+</p:sld>
+</file>
+
+<file path=ppt/slides/slide8.xml><?xml version="1.0" encoding="utf-8"?>
+<p:sld xmlns:a="http://schemas.openxmlformats.org/drawingml/2006/main" xmlns:r="http://schemas.openxmlformats.org/officeDocument/2006/relationships" xmlns:p="http://schemas.openxmlformats.org/presentationml/2006/main">
+  <p:cSld>
+    <p:spTree>
+      <p:nvGrpSpPr>
+        <p:cNvPr id="1" name=""/>
+        <p:cNvGrpSpPr/>
+        <p:nvPr/>
+      </p:nvGrpSpPr>
+      <p:grpSpPr>
+        <a:xfrm>
+          <a:off x="0" y="0"/>
+          <a:ext cx="0" cy="0"/>
+          <a:chOff x="0" y="0"/>
+          <a:chExt cx="0" cy="0"/>
+        </a:xfrm>
+      </p:grpSpPr>
+      <p:sp>
+        <p:nvSpPr>
+          <p:cNvPr id="2" name="Title 1">
+            <a:extLst>
+              <a:ext uri="{FF2B5EF4-FFF2-40B4-BE49-F238E27FC236}">
                 <a16:creationId xmlns:a16="http://schemas.microsoft.com/office/drawing/2014/main" id="{DC734871-5F68-444C-A451-DA303CD7156E}"/>
               </a:ext>
             </a:extLst>
@@ -4020,7 +4390,15 @@
           <a:p>
             <a:r>
               <a:rPr lang="de-CH" dirty="0"/>
-              <a:t>Planung</a:t>
+              <a:t>Planung </a:t>
+            </a:r>
+            <a:r>
+              <a:rPr lang="de-CH" dirty="0">
+                <a:solidFill>
+                  <a:srgbClr val="FF0000"/>
+                </a:solidFill>
+              </a:rPr>
+              <a:t>+ wie lange? Zeit planen (gut planen)</a:t>
             </a:r>
           </a:p>
         </p:txBody>

</xml_diff>